<commit_message>
updated ppt with screenshot after we find quest
</commit_message>
<xml_diff>
--- a/Group10.pptx
+++ b/Group10.pptx
@@ -9,9 +9,10 @@
     <p:sldId id="257" r:id="rId3"/>
     <p:sldId id="258" r:id="rId4"/>
     <p:sldId id="259" r:id="rId5"/>
-    <p:sldId id="260" r:id="rId6"/>
-    <p:sldId id="261" r:id="rId7"/>
-    <p:sldId id="262" r:id="rId8"/>
+    <p:sldId id="263" r:id="rId6"/>
+    <p:sldId id="260" r:id="rId7"/>
+    <p:sldId id="261" r:id="rId8"/>
+    <p:sldId id="262" r:id="rId9"/>
   </p:sldIdLst>
   <p:sldSz cx="12192000" cy="6858000"/>
   <p:notesSz cx="6858000" cy="9144000"/>
@@ -110,6 +111,11 @@
       </a:defRPr>
     </a:lvl9pPr>
   </p:defaultTextStyle>
+  <p:extLst>
+    <p:ext uri="{EFAFB233-063F-42B5-8137-9DF3F51BA10A}">
+      <p15:sldGuideLst xmlns:p15="http://schemas.microsoft.com/office/powerpoint/2012/main"/>
+    </p:ext>
+  </p:extLst>
 </p:presentation>
 </file>
 
@@ -260,7 +266,7 @@
           <a:p>
             <a:fld id="{7C59302E-758D-4BB2-A9E9-6109AD9EA511}" type="datetimeFigureOut">
               <a:rPr lang="en-US" smtClean="0"/>
-              <a:t>4/16/2021</a:t>
+              <a:t>4/20/2021</a:t>
             </a:fld>
             <a:endParaRPr lang="en-US"/>
           </a:p>
@@ -458,7 +464,7 @@
           <a:p>
             <a:fld id="{7C59302E-758D-4BB2-A9E9-6109AD9EA511}" type="datetimeFigureOut">
               <a:rPr lang="en-US" smtClean="0"/>
-              <a:t>4/16/2021</a:t>
+              <a:t>4/20/2021</a:t>
             </a:fld>
             <a:endParaRPr lang="en-US"/>
           </a:p>
@@ -666,7 +672,7 @@
           <a:p>
             <a:fld id="{7C59302E-758D-4BB2-A9E9-6109AD9EA511}" type="datetimeFigureOut">
               <a:rPr lang="en-US" smtClean="0"/>
-              <a:t>4/16/2021</a:t>
+              <a:t>4/20/2021</a:t>
             </a:fld>
             <a:endParaRPr lang="en-US"/>
           </a:p>
@@ -864,7 +870,7 @@
           <a:p>
             <a:fld id="{7C59302E-758D-4BB2-A9E9-6109AD9EA511}" type="datetimeFigureOut">
               <a:rPr lang="en-US" smtClean="0"/>
-              <a:t>4/16/2021</a:t>
+              <a:t>4/20/2021</a:t>
             </a:fld>
             <a:endParaRPr lang="en-US"/>
           </a:p>
@@ -1139,7 +1145,7 @@
           <a:p>
             <a:fld id="{7C59302E-758D-4BB2-A9E9-6109AD9EA511}" type="datetimeFigureOut">
               <a:rPr lang="en-US" smtClean="0"/>
-              <a:t>4/16/2021</a:t>
+              <a:t>4/20/2021</a:t>
             </a:fld>
             <a:endParaRPr lang="en-US"/>
           </a:p>
@@ -1404,7 +1410,7 @@
           <a:p>
             <a:fld id="{7C59302E-758D-4BB2-A9E9-6109AD9EA511}" type="datetimeFigureOut">
               <a:rPr lang="en-US" smtClean="0"/>
-              <a:t>4/16/2021</a:t>
+              <a:t>4/20/2021</a:t>
             </a:fld>
             <a:endParaRPr lang="en-US"/>
           </a:p>
@@ -1816,7 +1822,7 @@
           <a:p>
             <a:fld id="{7C59302E-758D-4BB2-A9E9-6109AD9EA511}" type="datetimeFigureOut">
               <a:rPr lang="en-US" smtClean="0"/>
-              <a:t>4/16/2021</a:t>
+              <a:t>4/20/2021</a:t>
             </a:fld>
             <a:endParaRPr lang="en-US"/>
           </a:p>
@@ -1957,7 +1963,7 @@
           <a:p>
             <a:fld id="{7C59302E-758D-4BB2-A9E9-6109AD9EA511}" type="datetimeFigureOut">
               <a:rPr lang="en-US" smtClean="0"/>
-              <a:t>4/16/2021</a:t>
+              <a:t>4/20/2021</a:t>
             </a:fld>
             <a:endParaRPr lang="en-US"/>
           </a:p>
@@ -2070,7 +2076,7 @@
           <a:p>
             <a:fld id="{7C59302E-758D-4BB2-A9E9-6109AD9EA511}" type="datetimeFigureOut">
               <a:rPr lang="en-US" smtClean="0"/>
-              <a:t>4/16/2021</a:t>
+              <a:t>4/20/2021</a:t>
             </a:fld>
             <a:endParaRPr lang="en-US"/>
           </a:p>
@@ -2381,7 +2387,7 @@
           <a:p>
             <a:fld id="{7C59302E-758D-4BB2-A9E9-6109AD9EA511}" type="datetimeFigureOut">
               <a:rPr lang="en-US" smtClean="0"/>
-              <a:t>4/16/2021</a:t>
+              <a:t>4/20/2021</a:t>
             </a:fld>
             <a:endParaRPr lang="en-US"/>
           </a:p>
@@ -2669,7 +2675,7 @@
           <a:p>
             <a:fld id="{7C59302E-758D-4BB2-A9E9-6109AD9EA511}" type="datetimeFigureOut">
               <a:rPr lang="en-US" smtClean="0"/>
-              <a:t>4/16/2021</a:t>
+              <a:t>4/20/2021</a:t>
             </a:fld>
             <a:endParaRPr lang="en-US"/>
           </a:p>
@@ -2910,7 +2916,7 @@
           <a:p>
             <a:fld id="{7C59302E-758D-4BB2-A9E9-6109AD9EA511}" type="datetimeFigureOut">
               <a:rPr lang="en-US" smtClean="0"/>
-              <a:t>4/16/2021</a:t>
+              <a:t>4/20/2021</a:t>
             </a:fld>
             <a:endParaRPr lang="en-US"/>
           </a:p>
@@ -7466,12 +7472,28 @@
               <a:buNone/>
             </a:pPr>
             <a:r>
-              <a:rPr lang="en-US" sz="2000">
+              <a:rPr lang="en-US" sz="2000" dirty="0">
                 <a:solidFill>
                   <a:schemeClr val="bg1"/>
                 </a:solidFill>
               </a:rPr>
-              <a:t>Home Page after clicking on both the colors.</a:t>
+              <a:t>Home Page after clicking on both the colors and if you are not nearer to the quest </a:t>
+            </a:r>
+            <a:r>
+              <a:rPr lang="en-US" sz="2000" dirty="0" err="1">
+                <a:solidFill>
+                  <a:schemeClr val="bg1"/>
+                </a:solidFill>
+              </a:rPr>
+              <a:t>locatioin</a:t>
+            </a:r>
+            <a:r>
+              <a:rPr lang="en-US" sz="2000" dirty="0">
+                <a:solidFill>
+                  <a:schemeClr val="bg1"/>
+                </a:solidFill>
+              </a:rPr>
+              <a:t>.</a:t>
             </a:r>
           </a:p>
         </p:txBody>
@@ -7552,6 +7574,647 @@
       </p:grpSpPr>
       <p:sp useBgFill="1">
         <p:nvSpPr>
+          <p:cNvPr id="35" name="Rectangle 34">
+            <a:extLst>
+              <a:ext uri="{FF2B5EF4-FFF2-40B4-BE49-F238E27FC236}">
+                <a16:creationId xmlns:a16="http://schemas.microsoft.com/office/drawing/2014/main" id="{33CD251C-A887-4D2F-925B-FC097198538B}"/>
+              </a:ext>
+              <a:ext uri="{C183D7F6-B498-43B3-948B-1728B52AA6E4}">
+                <adec:decorative xmlns:adec="http://schemas.microsoft.com/office/drawing/2017/decorative" val="1"/>
+              </a:ext>
+            </a:extLst>
+          </p:cNvPr>
+          <p:cNvSpPr>
+            <a:spLocks noGrp="1" noRot="1" noChangeAspect="1" noMove="1" noResize="1" noEditPoints="1" noAdjustHandles="1" noChangeArrowheads="1" noChangeShapeType="1" noTextEdit="1"/>
+          </p:cNvSpPr>
+          <p:nvPr>
+            <p:extLst>
+              <p:ext uri="{386F3935-93C4-4BCD-93E2-E3B085C9AB24}">
+                <p16:designElem xmlns:p16="http://schemas.microsoft.com/office/powerpoint/2015/main" val="1"/>
+              </p:ext>
+            </p:extLst>
+          </p:nvPr>
+        </p:nvSpPr>
+        <p:spPr>
+          <a:xfrm>
+            <a:off x="0" y="0"/>
+            <a:ext cx="12192000" cy="6858000"/>
+          </a:xfrm>
+          <a:prstGeom prst="rect">
+            <a:avLst/>
+          </a:prstGeom>
+          <a:ln>
+            <a:noFill/>
+          </a:ln>
+        </p:spPr>
+        <p:style>
+          <a:lnRef idx="2">
+            <a:schemeClr val="accent1">
+              <a:shade val="50000"/>
+            </a:schemeClr>
+          </a:lnRef>
+          <a:fillRef idx="1">
+            <a:schemeClr val="accent1"/>
+          </a:fillRef>
+          <a:effectRef idx="0">
+            <a:schemeClr val="accent1"/>
+          </a:effectRef>
+          <a:fontRef idx="minor">
+            <a:schemeClr val="lt1"/>
+          </a:fontRef>
+        </p:style>
+        <p:txBody>
+          <a:bodyPr rtlCol="0" anchor="ctr"/>
+          <a:lstStyle/>
+          <a:p>
+            <a:pPr algn="ctr"/>
+            <a:endParaRPr lang="en-US"/>
+          </a:p>
+        </p:txBody>
+      </p:sp>
+      <p:sp>
+        <p:nvSpPr>
+          <p:cNvPr id="37" name="Rectangle 36">
+            <a:extLst>
+              <a:ext uri="{FF2B5EF4-FFF2-40B4-BE49-F238E27FC236}">
+                <a16:creationId xmlns:a16="http://schemas.microsoft.com/office/drawing/2014/main" id="{B19D093C-27FB-4032-B282-42C4563F257C}"/>
+              </a:ext>
+              <a:ext uri="{C183D7F6-B498-43B3-948B-1728B52AA6E4}">
+                <adec:decorative xmlns:adec="http://schemas.microsoft.com/office/drawing/2017/decorative" val="1"/>
+              </a:ext>
+            </a:extLst>
+          </p:cNvPr>
+          <p:cNvSpPr>
+            <a:spLocks noGrp="1" noRot="1" noChangeAspect="1" noMove="1" noResize="1" noEditPoints="1" noAdjustHandles="1" noChangeArrowheads="1" noChangeShapeType="1" noTextEdit="1"/>
+          </p:cNvSpPr>
+          <p:nvPr>
+            <p:extLst>
+              <p:ext uri="{386F3935-93C4-4BCD-93E2-E3B085C9AB24}">
+                <p16:designElem xmlns:p16="http://schemas.microsoft.com/office/powerpoint/2015/main" val="1"/>
+              </p:ext>
+            </p:extLst>
+          </p:nvPr>
+        </p:nvSpPr>
+        <p:spPr>
+          <a:xfrm>
+            <a:off x="0" y="0"/>
+            <a:ext cx="4694548" cy="6858000"/>
+          </a:xfrm>
+          <a:prstGeom prst="rect">
+            <a:avLst/>
+          </a:prstGeom>
+          <a:solidFill>
+            <a:schemeClr val="tx1"/>
+          </a:solidFill>
+          <a:ln>
+            <a:noFill/>
+          </a:ln>
+        </p:spPr>
+        <p:style>
+          <a:lnRef idx="2">
+            <a:schemeClr val="accent1">
+              <a:shade val="50000"/>
+            </a:schemeClr>
+          </a:lnRef>
+          <a:fillRef idx="1">
+            <a:schemeClr val="accent1"/>
+          </a:fillRef>
+          <a:effectRef idx="0">
+            <a:schemeClr val="accent1"/>
+          </a:effectRef>
+          <a:fontRef idx="minor">
+            <a:schemeClr val="lt1"/>
+          </a:fontRef>
+        </p:style>
+        <p:txBody>
+          <a:bodyPr rtlCol="0" anchor="ctr"/>
+          <a:lstStyle/>
+          <a:p>
+            <a:pPr algn="ctr"/>
+            <a:endParaRPr lang="en-US"/>
+          </a:p>
+        </p:txBody>
+      </p:sp>
+      <p:grpSp>
+        <p:nvGrpSpPr>
+          <p:cNvPr id="39" name="Group 38">
+            <a:extLst>
+              <a:ext uri="{FF2B5EF4-FFF2-40B4-BE49-F238E27FC236}">
+                <a16:creationId xmlns:a16="http://schemas.microsoft.com/office/drawing/2014/main" id="{35EE815E-1BD3-4777-B652-6D98825BF66B}"/>
+              </a:ext>
+              <a:ext uri="{C183D7F6-B498-43B3-948B-1728B52AA6E4}">
+                <adec:decorative xmlns:adec="http://schemas.microsoft.com/office/drawing/2017/decorative" val="1"/>
+              </a:ext>
+            </a:extLst>
+          </p:cNvPr>
+          <p:cNvGrpSpPr>
+            <a:grpSpLocks noGrp="1" noUngrp="1" noRot="1" noChangeAspect="1" noMove="1" noResize="1"/>
+          </p:cNvGrpSpPr>
+          <p:nvPr>
+            <p:extLst>
+              <p:ext uri="{386F3935-93C4-4BCD-93E2-E3B085C9AB24}">
+                <p16:designElem xmlns:p16="http://schemas.microsoft.com/office/powerpoint/2015/main" val="1"/>
+              </p:ext>
+            </p:extLst>
+          </p:nvPr>
+        </p:nvGrpSpPr>
+        <p:grpSpPr>
+          <a:xfrm>
+            <a:off x="767290" y="681628"/>
+            <a:ext cx="1128382" cy="847206"/>
+            <a:chOff x="668003" y="1684057"/>
+            <a:chExt cx="1128382" cy="847206"/>
+          </a:xfrm>
+        </p:grpSpPr>
+        <p:sp>
+          <p:nvSpPr>
+            <p:cNvPr id="40" name="Freeform 5">
+              <a:extLst>
+                <a:ext uri="{FF2B5EF4-FFF2-40B4-BE49-F238E27FC236}">
+                  <a16:creationId xmlns:a16="http://schemas.microsoft.com/office/drawing/2014/main" id="{E6692982-4A7D-4392-87CD-F0CD4B027DDE}"/>
+                </a:ext>
+                <a:ext uri="{C183D7F6-B498-43B3-948B-1728B52AA6E4}">
+                  <adec:decorative xmlns:adec="http://schemas.microsoft.com/office/drawing/2017/decorative" val="1"/>
+                </a:ext>
+              </a:extLst>
+            </p:cNvPr>
+            <p:cNvSpPr>
+              <a:spLocks/>
+            </p:cNvSpPr>
+            <p:nvPr>
+              <p:extLst>
+                <p:ext uri="{386F3935-93C4-4BCD-93E2-E3B085C9AB24}">
+                  <p16:designElem xmlns:p16="http://schemas.microsoft.com/office/powerpoint/2015/main" val="1"/>
+                </p:ext>
+              </p:extLst>
+            </p:nvPr>
+          </p:nvSpPr>
+          <p:spPr bwMode="auto">
+            <a:xfrm>
+              <a:off x="668003" y="1935883"/>
+              <a:ext cx="675351" cy="595380"/>
+            </a:xfrm>
+            <a:custGeom>
+              <a:avLst/>
+              <a:gdLst>
+                <a:gd name="T0" fmla="*/ 225 w 785"/>
+                <a:gd name="T1" fmla="*/ 692 h 692"/>
+                <a:gd name="T2" fmla="*/ 177 w 785"/>
+                <a:gd name="T3" fmla="*/ 665 h 692"/>
+                <a:gd name="T4" fmla="*/ 9 w 785"/>
+                <a:gd name="T5" fmla="*/ 374 h 692"/>
+                <a:gd name="T6" fmla="*/ 9 w 785"/>
+                <a:gd name="T7" fmla="*/ 318 h 692"/>
+                <a:gd name="T8" fmla="*/ 177 w 785"/>
+                <a:gd name="T9" fmla="*/ 27 h 692"/>
+                <a:gd name="T10" fmla="*/ 225 w 785"/>
+                <a:gd name="T11" fmla="*/ 0 h 692"/>
+                <a:gd name="T12" fmla="*/ 561 w 785"/>
+                <a:gd name="T13" fmla="*/ 0 h 692"/>
+                <a:gd name="T14" fmla="*/ 609 w 785"/>
+                <a:gd name="T15" fmla="*/ 27 h 692"/>
+                <a:gd name="T16" fmla="*/ 777 w 785"/>
+                <a:gd name="T17" fmla="*/ 318 h 692"/>
+                <a:gd name="T18" fmla="*/ 777 w 785"/>
+                <a:gd name="T19" fmla="*/ 374 h 692"/>
+                <a:gd name="T20" fmla="*/ 609 w 785"/>
+                <a:gd name="T21" fmla="*/ 665 h 692"/>
+                <a:gd name="T22" fmla="*/ 561 w 785"/>
+                <a:gd name="T23" fmla="*/ 692 h 692"/>
+                <a:gd name="T24" fmla="*/ 225 w 785"/>
+                <a:gd name="T25" fmla="*/ 692 h 692"/>
+              </a:gdLst>
+              <a:ahLst/>
+              <a:cxnLst>
+                <a:cxn ang="0">
+                  <a:pos x="T0" y="T1"/>
+                </a:cxn>
+                <a:cxn ang="0">
+                  <a:pos x="T2" y="T3"/>
+                </a:cxn>
+                <a:cxn ang="0">
+                  <a:pos x="T4" y="T5"/>
+                </a:cxn>
+                <a:cxn ang="0">
+                  <a:pos x="T6" y="T7"/>
+                </a:cxn>
+                <a:cxn ang="0">
+                  <a:pos x="T8" y="T9"/>
+                </a:cxn>
+                <a:cxn ang="0">
+                  <a:pos x="T10" y="T11"/>
+                </a:cxn>
+                <a:cxn ang="0">
+                  <a:pos x="T12" y="T13"/>
+                </a:cxn>
+                <a:cxn ang="0">
+                  <a:pos x="T14" y="T15"/>
+                </a:cxn>
+                <a:cxn ang="0">
+                  <a:pos x="T16" y="T17"/>
+                </a:cxn>
+                <a:cxn ang="0">
+                  <a:pos x="T18" y="T19"/>
+                </a:cxn>
+                <a:cxn ang="0">
+                  <a:pos x="T20" y="T21"/>
+                </a:cxn>
+                <a:cxn ang="0">
+                  <a:pos x="T22" y="T23"/>
+                </a:cxn>
+                <a:cxn ang="0">
+                  <a:pos x="T24" y="T25"/>
+                </a:cxn>
+              </a:cxnLst>
+              <a:rect l="0" t="0" r="r" b="b"/>
+              <a:pathLst>
+                <a:path w="785" h="692">
+                  <a:moveTo>
+                    <a:pt x="225" y="692"/>
+                  </a:moveTo>
+                  <a:cubicBezTo>
+                    <a:pt x="207" y="692"/>
+                    <a:pt x="185" y="680"/>
+                    <a:pt x="177" y="665"/>
+                  </a:cubicBezTo>
+                  <a:cubicBezTo>
+                    <a:pt x="9" y="374"/>
+                    <a:pt x="9" y="374"/>
+                    <a:pt x="9" y="374"/>
+                  </a:cubicBezTo>
+                  <a:cubicBezTo>
+                    <a:pt x="0" y="358"/>
+                    <a:pt x="0" y="334"/>
+                    <a:pt x="9" y="318"/>
+                  </a:cubicBezTo>
+                  <a:cubicBezTo>
+                    <a:pt x="177" y="27"/>
+                    <a:pt x="177" y="27"/>
+                    <a:pt x="177" y="27"/>
+                  </a:cubicBezTo>
+                  <a:cubicBezTo>
+                    <a:pt x="185" y="12"/>
+                    <a:pt x="207" y="0"/>
+                    <a:pt x="225" y="0"/>
+                  </a:cubicBezTo>
+                  <a:cubicBezTo>
+                    <a:pt x="561" y="0"/>
+                    <a:pt x="561" y="0"/>
+                    <a:pt x="561" y="0"/>
+                  </a:cubicBezTo>
+                  <a:cubicBezTo>
+                    <a:pt x="578" y="0"/>
+                    <a:pt x="600" y="12"/>
+                    <a:pt x="609" y="27"/>
+                  </a:cubicBezTo>
+                  <a:cubicBezTo>
+                    <a:pt x="777" y="318"/>
+                    <a:pt x="777" y="318"/>
+                    <a:pt x="777" y="318"/>
+                  </a:cubicBezTo>
+                  <a:cubicBezTo>
+                    <a:pt x="785" y="334"/>
+                    <a:pt x="785" y="358"/>
+                    <a:pt x="777" y="374"/>
+                  </a:cubicBezTo>
+                  <a:cubicBezTo>
+                    <a:pt x="609" y="665"/>
+                    <a:pt x="609" y="665"/>
+                    <a:pt x="609" y="665"/>
+                  </a:cubicBezTo>
+                  <a:cubicBezTo>
+                    <a:pt x="600" y="680"/>
+                    <a:pt x="578" y="692"/>
+                    <a:pt x="561" y="692"/>
+                  </a:cubicBezTo>
+                  <a:lnTo>
+                    <a:pt x="225" y="692"/>
+                  </a:lnTo>
+                  <a:close/>
+                </a:path>
+              </a:pathLst>
+            </a:custGeom>
+            <a:noFill/>
+            <a:ln w="28575" cmpd="sng">
+              <a:solidFill>
+                <a:schemeClr val="bg1"/>
+              </a:solidFill>
+            </a:ln>
+          </p:spPr>
+          <p:txBody>
+            <a:bodyPr vert="horz" wrap="square" lIns="91440" tIns="45720" rIns="91440" bIns="45720" numCol="1" anchor="t" anchorCtr="0" compatLnSpc="1">
+              <a:prstTxWarp prst="textNoShape">
+                <a:avLst/>
+              </a:prstTxWarp>
+            </a:bodyPr>
+            <a:lstStyle/>
+            <a:p>
+              <a:endParaRPr lang="en-US"/>
+            </a:p>
+          </p:txBody>
+        </p:sp>
+        <p:sp>
+          <p:nvSpPr>
+            <p:cNvPr id="41" name="Freeform 5">
+              <a:extLst>
+                <a:ext uri="{FF2B5EF4-FFF2-40B4-BE49-F238E27FC236}">
+                  <a16:creationId xmlns:a16="http://schemas.microsoft.com/office/drawing/2014/main" id="{196485F7-F277-4123-AC53-98EA4C858774}"/>
+                </a:ext>
+                <a:ext uri="{C183D7F6-B498-43B3-948B-1728B52AA6E4}">
+                  <adec:decorative xmlns:adec="http://schemas.microsoft.com/office/drawing/2017/decorative" val="1"/>
+                </a:ext>
+              </a:extLst>
+            </p:cNvPr>
+            <p:cNvSpPr>
+              <a:spLocks/>
+            </p:cNvSpPr>
+            <p:nvPr>
+              <p:extLst>
+                <p:ext uri="{386F3935-93C4-4BCD-93E2-E3B085C9AB24}">
+                  <p16:designElem xmlns:p16="http://schemas.microsoft.com/office/powerpoint/2015/main" val="1"/>
+                </p:ext>
+              </p:extLst>
+            </p:nvPr>
+          </p:nvSpPr>
+          <p:spPr bwMode="auto">
+            <a:xfrm>
+              <a:off x="1245893" y="1684057"/>
+              <a:ext cx="550492" cy="485306"/>
+            </a:xfrm>
+            <a:custGeom>
+              <a:avLst/>
+              <a:gdLst>
+                <a:gd name="T0" fmla="*/ 225 w 785"/>
+                <a:gd name="T1" fmla="*/ 692 h 692"/>
+                <a:gd name="T2" fmla="*/ 177 w 785"/>
+                <a:gd name="T3" fmla="*/ 665 h 692"/>
+                <a:gd name="T4" fmla="*/ 9 w 785"/>
+                <a:gd name="T5" fmla="*/ 374 h 692"/>
+                <a:gd name="T6" fmla="*/ 9 w 785"/>
+                <a:gd name="T7" fmla="*/ 318 h 692"/>
+                <a:gd name="T8" fmla="*/ 177 w 785"/>
+                <a:gd name="T9" fmla="*/ 27 h 692"/>
+                <a:gd name="T10" fmla="*/ 225 w 785"/>
+                <a:gd name="T11" fmla="*/ 0 h 692"/>
+                <a:gd name="T12" fmla="*/ 561 w 785"/>
+                <a:gd name="T13" fmla="*/ 0 h 692"/>
+                <a:gd name="T14" fmla="*/ 609 w 785"/>
+                <a:gd name="T15" fmla="*/ 27 h 692"/>
+                <a:gd name="T16" fmla="*/ 777 w 785"/>
+                <a:gd name="T17" fmla="*/ 318 h 692"/>
+                <a:gd name="T18" fmla="*/ 777 w 785"/>
+                <a:gd name="T19" fmla="*/ 374 h 692"/>
+                <a:gd name="T20" fmla="*/ 609 w 785"/>
+                <a:gd name="T21" fmla="*/ 665 h 692"/>
+                <a:gd name="T22" fmla="*/ 561 w 785"/>
+                <a:gd name="T23" fmla="*/ 692 h 692"/>
+                <a:gd name="T24" fmla="*/ 225 w 785"/>
+                <a:gd name="T25" fmla="*/ 692 h 692"/>
+              </a:gdLst>
+              <a:ahLst/>
+              <a:cxnLst>
+                <a:cxn ang="0">
+                  <a:pos x="T0" y="T1"/>
+                </a:cxn>
+                <a:cxn ang="0">
+                  <a:pos x="T2" y="T3"/>
+                </a:cxn>
+                <a:cxn ang="0">
+                  <a:pos x="T4" y="T5"/>
+                </a:cxn>
+                <a:cxn ang="0">
+                  <a:pos x="T6" y="T7"/>
+                </a:cxn>
+                <a:cxn ang="0">
+                  <a:pos x="T8" y="T9"/>
+                </a:cxn>
+                <a:cxn ang="0">
+                  <a:pos x="T10" y="T11"/>
+                </a:cxn>
+                <a:cxn ang="0">
+                  <a:pos x="T12" y="T13"/>
+                </a:cxn>
+                <a:cxn ang="0">
+                  <a:pos x="T14" y="T15"/>
+                </a:cxn>
+                <a:cxn ang="0">
+                  <a:pos x="T16" y="T17"/>
+                </a:cxn>
+                <a:cxn ang="0">
+                  <a:pos x="T18" y="T19"/>
+                </a:cxn>
+                <a:cxn ang="0">
+                  <a:pos x="T20" y="T21"/>
+                </a:cxn>
+                <a:cxn ang="0">
+                  <a:pos x="T22" y="T23"/>
+                </a:cxn>
+                <a:cxn ang="0">
+                  <a:pos x="T24" y="T25"/>
+                </a:cxn>
+              </a:cxnLst>
+              <a:rect l="0" t="0" r="r" b="b"/>
+              <a:pathLst>
+                <a:path w="785" h="692">
+                  <a:moveTo>
+                    <a:pt x="225" y="692"/>
+                  </a:moveTo>
+                  <a:cubicBezTo>
+                    <a:pt x="207" y="692"/>
+                    <a:pt x="185" y="680"/>
+                    <a:pt x="177" y="665"/>
+                  </a:cubicBezTo>
+                  <a:cubicBezTo>
+                    <a:pt x="9" y="374"/>
+                    <a:pt x="9" y="374"/>
+                    <a:pt x="9" y="374"/>
+                  </a:cubicBezTo>
+                  <a:cubicBezTo>
+                    <a:pt x="0" y="358"/>
+                    <a:pt x="0" y="334"/>
+                    <a:pt x="9" y="318"/>
+                  </a:cubicBezTo>
+                  <a:cubicBezTo>
+                    <a:pt x="177" y="27"/>
+                    <a:pt x="177" y="27"/>
+                    <a:pt x="177" y="27"/>
+                  </a:cubicBezTo>
+                  <a:cubicBezTo>
+                    <a:pt x="185" y="12"/>
+                    <a:pt x="207" y="0"/>
+                    <a:pt x="225" y="0"/>
+                  </a:cubicBezTo>
+                  <a:cubicBezTo>
+                    <a:pt x="561" y="0"/>
+                    <a:pt x="561" y="0"/>
+                    <a:pt x="561" y="0"/>
+                  </a:cubicBezTo>
+                  <a:cubicBezTo>
+                    <a:pt x="578" y="0"/>
+                    <a:pt x="600" y="12"/>
+                    <a:pt x="609" y="27"/>
+                  </a:cubicBezTo>
+                  <a:cubicBezTo>
+                    <a:pt x="777" y="318"/>
+                    <a:pt x="777" y="318"/>
+                    <a:pt x="777" y="318"/>
+                  </a:cubicBezTo>
+                  <a:cubicBezTo>
+                    <a:pt x="785" y="334"/>
+                    <a:pt x="785" y="358"/>
+                    <a:pt x="777" y="374"/>
+                  </a:cubicBezTo>
+                  <a:cubicBezTo>
+                    <a:pt x="609" y="665"/>
+                    <a:pt x="609" y="665"/>
+                    <a:pt x="609" y="665"/>
+                  </a:cubicBezTo>
+                  <a:cubicBezTo>
+                    <a:pt x="600" y="680"/>
+                    <a:pt x="578" y="692"/>
+                    <a:pt x="561" y="692"/>
+                  </a:cubicBezTo>
+                  <a:lnTo>
+                    <a:pt x="225" y="692"/>
+                  </a:lnTo>
+                  <a:close/>
+                </a:path>
+              </a:pathLst>
+            </a:custGeom>
+            <a:noFill/>
+            <a:ln w="28575" cmpd="sng">
+              <a:solidFill>
+                <a:schemeClr val="bg1"/>
+              </a:solidFill>
+            </a:ln>
+          </p:spPr>
+          <p:txBody>
+            <a:bodyPr vert="horz" wrap="square" lIns="91440" tIns="45720" rIns="91440" bIns="45720" numCol="1" anchor="t" anchorCtr="0" compatLnSpc="1">
+              <a:prstTxWarp prst="textNoShape">
+                <a:avLst/>
+              </a:prstTxWarp>
+            </a:bodyPr>
+            <a:lstStyle/>
+            <a:p>
+              <a:endParaRPr lang="en-US"/>
+            </a:p>
+          </p:txBody>
+        </p:sp>
+      </p:grpSp>
+      <p:sp>
+        <p:nvSpPr>
+          <p:cNvPr id="9" name="Content Placeholder 8">
+            <a:extLst>
+              <a:ext uri="{FF2B5EF4-FFF2-40B4-BE49-F238E27FC236}">
+                <a16:creationId xmlns:a16="http://schemas.microsoft.com/office/drawing/2014/main" id="{80EE1330-3422-4CA9-83BC-3C2215ED3459}"/>
+              </a:ext>
+            </a:extLst>
+          </p:cNvPr>
+          <p:cNvSpPr>
+            <a:spLocks noGrp="1"/>
+          </p:cNvSpPr>
+          <p:nvPr>
+            <p:ph idx="1"/>
+          </p:nvPr>
+        </p:nvSpPr>
+        <p:spPr>
+          <a:xfrm>
+            <a:off x="767290" y="3383121"/>
+            <a:ext cx="3582072" cy="2793251"/>
+          </a:xfrm>
+        </p:spPr>
+        <p:txBody>
+          <a:bodyPr anchor="t">
+            <a:normAutofit/>
+          </a:bodyPr>
+          <a:lstStyle/>
+          <a:p>
+            <a:r>
+              <a:rPr lang="en-US" sz="2000">
+                <a:solidFill>
+                  <a:schemeClr val="bg1"/>
+                </a:solidFill>
+              </a:rPr>
+              <a:t>When user finds the quest location.</a:t>
+            </a:r>
+          </a:p>
+        </p:txBody>
+      </p:sp>
+      <p:pic>
+        <p:nvPicPr>
+          <p:cNvPr id="7" name="Picture 6" descr="Graphical user interface&#10;&#10;Description automatically generated">
+            <a:extLst>
+              <a:ext uri="{FF2B5EF4-FFF2-40B4-BE49-F238E27FC236}">
+                <a16:creationId xmlns:a16="http://schemas.microsoft.com/office/drawing/2014/main" id="{8A82762D-BE75-47B6-B6A2-53185735BDD2}"/>
+              </a:ext>
+            </a:extLst>
+          </p:cNvPr>
+          <p:cNvPicPr>
+            <a:picLocks noChangeAspect="1"/>
+          </p:cNvPicPr>
+          <p:nvPr/>
+        </p:nvPicPr>
+        <p:blipFill rotWithShape="1">
+          <a:blip r:embed="rId2">
+            <a:extLst>
+              <a:ext uri="{28A0092B-C50C-407E-A947-70E740481C1C}">
+                <a14:useLocalDpi xmlns:a14="http://schemas.microsoft.com/office/drawing/2010/main" val="0"/>
+              </a:ext>
+            </a:extLst>
+          </a:blip>
+          <a:srcRect l="5654" t="9091" r="29702"/>
+          <a:stretch/>
+        </p:blipFill>
+        <p:spPr>
+          <a:xfrm>
+            <a:off x="5611084" y="903730"/>
+            <a:ext cx="5653667" cy="4472307"/>
+          </a:xfrm>
+          <a:prstGeom prst="rect">
+            <a:avLst/>
+          </a:prstGeom>
+        </p:spPr>
+      </p:pic>
+    </p:spTree>
+    <p:extLst>
+      <p:ext uri="{BB962C8B-B14F-4D97-AF65-F5344CB8AC3E}">
+        <p14:creationId xmlns:p14="http://schemas.microsoft.com/office/powerpoint/2010/main" val="2406414450"/>
+      </p:ext>
+    </p:extLst>
+  </p:cSld>
+  <p:clrMapOvr>
+    <a:masterClrMapping/>
+  </p:clrMapOvr>
+</p:sld>
+</file>
+
+<file path=ppt/slides/slide6.xml><?xml version="1.0" encoding="utf-8"?>
+<p:sld xmlns:a="http://schemas.openxmlformats.org/drawingml/2006/main" xmlns:r="http://schemas.openxmlformats.org/officeDocument/2006/relationships" xmlns:p="http://schemas.openxmlformats.org/presentationml/2006/main">
+  <p:cSld>
+    <p:bg>
+      <p:bgPr>
+        <a:solidFill>
+          <a:schemeClr val="bg1"/>
+        </a:solidFill>
+        <a:effectLst/>
+      </p:bgPr>
+    </p:bg>
+    <p:spTree>
+      <p:nvGrpSpPr>
+        <p:cNvPr id="1" name=""/>
+        <p:cNvGrpSpPr/>
+        <p:nvPr/>
+      </p:nvGrpSpPr>
+      <p:grpSpPr>
+        <a:xfrm>
+          <a:off x="0" y="0"/>
+          <a:ext cx="0" cy="0"/>
+          <a:chOff x="0" y="0"/>
+          <a:chExt cx="0" cy="0"/>
+        </a:xfrm>
+      </p:grpSpPr>
+      <p:sp useBgFill="1">
+        <p:nvSpPr>
           <p:cNvPr id="17" name="Rectangle 16">
             <a:extLst>
               <a:ext uri="{FF2B5EF4-FFF2-40B4-BE49-F238E27FC236}">
@@ -8173,7 +8836,7 @@
 </p:sld>
 </file>
 
-<file path=ppt/slides/slide6.xml><?xml version="1.0" encoding="utf-8"?>
+<file path=ppt/slides/slide7.xml><?xml version="1.0" encoding="utf-8"?>
 <p:sld xmlns:a="http://schemas.openxmlformats.org/drawingml/2006/main" xmlns:r="http://schemas.openxmlformats.org/officeDocument/2006/relationships" xmlns:p="http://schemas.openxmlformats.org/presentationml/2006/main">
   <p:cSld>
     <p:bg>
@@ -8764,7 +9427,7 @@
 </p:sld>
 </file>
 
-<file path=ppt/slides/slide7.xml><?xml version="1.0" encoding="utf-8"?>
+<file path=ppt/slides/slide8.xml><?xml version="1.0" encoding="utf-8"?>
 <p:sld xmlns:a="http://schemas.openxmlformats.org/drawingml/2006/main" xmlns:r="http://schemas.openxmlformats.org/officeDocument/2006/relationships" xmlns:p="http://schemas.openxmlformats.org/presentationml/2006/main">
   <p:cSld>
     <p:bg>

</xml_diff>